<commit_message>
update the history figure
</commit_message>
<xml_diff>
--- a/Figures/LLM_history.pptx
+++ b/Figures/LLM_history.pptx
@@ -243,7 +243,7 @@
           <a:p>
             <a:fld id="{174EC0A7-F246-4648-9213-9AE92D55939B}" type="datetimeFigureOut">
               <a:rPr lang="en-US" smtClean="0"/>
-              <a:t>12/18/2024</a:t>
+              <a:t>12/22/2024</a:t>
             </a:fld>
             <a:endParaRPr lang="en-US"/>
           </a:p>
@@ -413,7 +413,7 @@
           <a:p>
             <a:fld id="{174EC0A7-F246-4648-9213-9AE92D55939B}" type="datetimeFigureOut">
               <a:rPr lang="en-US" smtClean="0"/>
-              <a:t>12/18/2024</a:t>
+              <a:t>12/22/2024</a:t>
             </a:fld>
             <a:endParaRPr lang="en-US"/>
           </a:p>
@@ -593,7 +593,7 @@
           <a:p>
             <a:fld id="{174EC0A7-F246-4648-9213-9AE92D55939B}" type="datetimeFigureOut">
               <a:rPr lang="en-US" smtClean="0"/>
-              <a:t>12/18/2024</a:t>
+              <a:t>12/22/2024</a:t>
             </a:fld>
             <a:endParaRPr lang="en-US"/>
           </a:p>
@@ -763,7 +763,7 @@
           <a:p>
             <a:fld id="{174EC0A7-F246-4648-9213-9AE92D55939B}" type="datetimeFigureOut">
               <a:rPr lang="en-US" smtClean="0"/>
-              <a:t>12/18/2024</a:t>
+              <a:t>12/22/2024</a:t>
             </a:fld>
             <a:endParaRPr lang="en-US"/>
           </a:p>
@@ -1009,7 +1009,7 @@
           <a:p>
             <a:fld id="{174EC0A7-F246-4648-9213-9AE92D55939B}" type="datetimeFigureOut">
               <a:rPr lang="en-US" smtClean="0"/>
-              <a:t>12/18/2024</a:t>
+              <a:t>12/22/2024</a:t>
             </a:fld>
             <a:endParaRPr lang="en-US"/>
           </a:p>
@@ -1241,7 +1241,7 @@
           <a:p>
             <a:fld id="{174EC0A7-F246-4648-9213-9AE92D55939B}" type="datetimeFigureOut">
               <a:rPr lang="en-US" smtClean="0"/>
-              <a:t>12/18/2024</a:t>
+              <a:t>12/22/2024</a:t>
             </a:fld>
             <a:endParaRPr lang="en-US"/>
           </a:p>
@@ -1608,7 +1608,7 @@
           <a:p>
             <a:fld id="{174EC0A7-F246-4648-9213-9AE92D55939B}" type="datetimeFigureOut">
               <a:rPr lang="en-US" smtClean="0"/>
-              <a:t>12/18/2024</a:t>
+              <a:t>12/22/2024</a:t>
             </a:fld>
             <a:endParaRPr lang="en-US"/>
           </a:p>
@@ -1726,7 +1726,7 @@
           <a:p>
             <a:fld id="{174EC0A7-F246-4648-9213-9AE92D55939B}" type="datetimeFigureOut">
               <a:rPr lang="en-US" smtClean="0"/>
-              <a:t>12/18/2024</a:t>
+              <a:t>12/22/2024</a:t>
             </a:fld>
             <a:endParaRPr lang="en-US"/>
           </a:p>
@@ -1821,7 +1821,7 @@
           <a:p>
             <a:fld id="{174EC0A7-F246-4648-9213-9AE92D55939B}" type="datetimeFigureOut">
               <a:rPr lang="en-US" smtClean="0"/>
-              <a:t>12/18/2024</a:t>
+              <a:t>12/22/2024</a:t>
             </a:fld>
             <a:endParaRPr lang="en-US"/>
           </a:p>
@@ -2098,7 +2098,7 @@
           <a:p>
             <a:fld id="{174EC0A7-F246-4648-9213-9AE92D55939B}" type="datetimeFigureOut">
               <a:rPr lang="en-US" smtClean="0"/>
-              <a:t>12/18/2024</a:t>
+              <a:t>12/22/2024</a:t>
             </a:fld>
             <a:endParaRPr lang="en-US"/>
           </a:p>
@@ -2355,7 +2355,7 @@
           <a:p>
             <a:fld id="{174EC0A7-F246-4648-9213-9AE92D55939B}" type="datetimeFigureOut">
               <a:rPr lang="en-US" smtClean="0"/>
-              <a:t>12/18/2024</a:t>
+              <a:t>12/22/2024</a:t>
             </a:fld>
             <a:endParaRPr lang="en-US"/>
           </a:p>
@@ -2568,7 +2568,7 @@
           <a:p>
             <a:fld id="{174EC0A7-F246-4648-9213-9AE92D55939B}" type="datetimeFigureOut">
               <a:rPr lang="en-US" smtClean="0"/>
-              <a:t>12/18/2024</a:t>
+              <a:t>12/22/2024</a:t>
             </a:fld>
             <a:endParaRPr lang="en-US"/>
           </a:p>
@@ -20519,6 +20519,127 @@
           </a:p>
         </p:txBody>
       </p:sp>
+      <p:sp>
+        <p:nvSpPr>
+          <p:cNvPr id="3" name="Rectangle: Rounded Corners 2">
+            <a:extLst>
+              <a:ext uri="{FF2B5EF4-FFF2-40B4-BE49-F238E27FC236}">
+                <a16:creationId xmlns:a16="http://schemas.microsoft.com/office/drawing/2014/main" id="{CF3B8BBF-0DF3-A5C5-947E-034FDB0CEC14}"/>
+              </a:ext>
+            </a:extLst>
+          </p:cNvPr>
+          <p:cNvSpPr/>
+          <p:nvPr/>
+        </p:nvSpPr>
+        <p:spPr>
+          <a:xfrm>
+            <a:off x="1673818" y="5313500"/>
+            <a:ext cx="1185292" cy="441284"/>
+          </a:xfrm>
+          <a:prstGeom prst="roundRect">
+            <a:avLst/>
+          </a:prstGeom>
+          <a:solidFill>
+            <a:schemeClr val="bg1">
+              <a:lumMod val="50000"/>
+            </a:schemeClr>
+          </a:solidFill>
+          <a:ln>
+            <a:noFill/>
+          </a:ln>
+        </p:spPr>
+        <p:style>
+          <a:lnRef idx="2">
+            <a:schemeClr val="accent1">
+              <a:shade val="15000"/>
+            </a:schemeClr>
+          </a:lnRef>
+          <a:fillRef idx="1">
+            <a:schemeClr val="accent1"/>
+          </a:fillRef>
+          <a:effectRef idx="0">
+            <a:schemeClr val="accent1"/>
+          </a:effectRef>
+          <a:fontRef idx="minor">
+            <a:schemeClr val="lt1"/>
+          </a:fontRef>
+        </p:style>
+        <p:txBody>
+          <a:bodyPr rtlCol="0" anchor="ctr"/>
+          <a:lstStyle/>
+          <a:p>
+            <a:pPr algn="ctr"/>
+            <a:r>
+              <a:rPr lang="en-US" sz="1600" b="1" dirty="0"/>
+              <a:t>Open Source</a:t>
+            </a:r>
+          </a:p>
+        </p:txBody>
+      </p:sp>
+      <p:sp>
+        <p:nvSpPr>
+          <p:cNvPr id="18" name="Rectangle: Rounded Corners 17">
+            <a:extLst>
+              <a:ext uri="{FF2B5EF4-FFF2-40B4-BE49-F238E27FC236}">
+                <a16:creationId xmlns:a16="http://schemas.microsoft.com/office/drawing/2014/main" id="{7427D617-3E20-C690-1850-24F17AE0D365}"/>
+              </a:ext>
+            </a:extLst>
+          </p:cNvPr>
+          <p:cNvSpPr/>
+          <p:nvPr/>
+        </p:nvSpPr>
+        <p:spPr>
+          <a:xfrm>
+            <a:off x="1671672" y="5878582"/>
+            <a:ext cx="1185292" cy="441284"/>
+          </a:xfrm>
+          <a:prstGeom prst="roundRect">
+            <a:avLst/>
+          </a:prstGeom>
+          <a:noFill/>
+          <a:ln>
+            <a:solidFill>
+              <a:schemeClr val="bg1">
+                <a:lumMod val="50000"/>
+              </a:schemeClr>
+            </a:solidFill>
+          </a:ln>
+        </p:spPr>
+        <p:style>
+          <a:lnRef idx="2">
+            <a:schemeClr val="accent1">
+              <a:shade val="15000"/>
+            </a:schemeClr>
+          </a:lnRef>
+          <a:fillRef idx="1">
+            <a:schemeClr val="accent1"/>
+          </a:fillRef>
+          <a:effectRef idx="0">
+            <a:schemeClr val="accent1"/>
+          </a:effectRef>
+          <a:fontRef idx="minor">
+            <a:schemeClr val="lt1"/>
+          </a:fontRef>
+        </p:style>
+        <p:txBody>
+          <a:bodyPr rtlCol="0" anchor="ctr"/>
+          <a:lstStyle/>
+          <a:p>
+            <a:pPr algn="ctr"/>
+            <a:r>
+              <a:rPr lang="en-US" sz="1600" b="1" dirty="0">
+                <a:solidFill>
+                  <a:schemeClr val="tx1">
+                    <a:lumMod val="50000"/>
+                    <a:lumOff val="50000"/>
+                  </a:schemeClr>
+                </a:solidFill>
+              </a:rPr>
+              <a:t>Closed Source</a:t>
+            </a:r>
+          </a:p>
+        </p:txBody>
+      </p:sp>
     </p:spTree>
     <p:extLst>
       <p:ext uri="{BB962C8B-B14F-4D97-AF65-F5344CB8AC3E}">

</xml_diff>